<commit_message>
updated image and added short name
</commit_message>
<xml_diff>
--- a/docs/images/softing-edgeconnector-siemens-architecture-diagram.pptx
+++ b/docs/images/softing-edgeconnector-siemens-architecture-diagram.pptx
@@ -3673,36 +3673,6 @@
           </p:spPr>
         </p:pic>
       </p:grpSp>
-      <p:pic>
-        <p:nvPicPr>
-          <p:cNvPr id="7" name="Picture 6"/>
-          <p:cNvPicPr>
-            <a:picLocks noChangeAspect="1"/>
-          </p:cNvPicPr>
-          <p:nvPr/>
-        </p:nvPicPr>
-        <p:blipFill>
-          <a:blip r:embed="rId25">
-            <a:extLst>
-              <a:ext uri="{28A0092B-C50C-407E-A947-70E740481C1C}">
-                <a14:useLocalDpi xmlns:a14="http://schemas.microsoft.com/office/drawing/2010/main" val="0"/>
-              </a:ext>
-            </a:extLst>
-          </a:blip>
-          <a:stretch>
-            <a:fillRect/>
-          </a:stretch>
-        </p:blipFill>
-        <p:spPr>
-          <a:xfrm>
-            <a:off x="961358" y="2285468"/>
-            <a:ext cx="1262650" cy="1306379"/>
-          </a:xfrm>
-          <a:prstGeom prst="rect">
-            <a:avLst/>
-          </a:prstGeom>
-        </p:spPr>
-      </p:pic>
       <p:grpSp>
         <p:nvGrpSpPr>
           <p:cNvPr id="25" name="Group 24"/>
@@ -3771,7 +3741,7 @@
             <p:nvPr/>
           </p:nvPicPr>
           <p:blipFill>
-            <a:blip r:embed="rId26">
+            <a:blip r:embed="rId25">
               <a:extLst>
                 <a:ext uri="{28A0092B-C50C-407E-A947-70E740481C1C}">
                   <a14:useLocalDpi xmlns:a14="http://schemas.microsoft.com/office/drawing/2010/main" val="0"/>
@@ -3817,6 +3787,36 @@
           </p:spPr>
         </p:pic>
       </p:grpSp>
+      <p:pic>
+        <p:nvPicPr>
+          <p:cNvPr id="31" name="Picture 30"/>
+          <p:cNvPicPr>
+            <a:picLocks noChangeAspect="1"/>
+          </p:cNvPicPr>
+          <p:nvPr/>
+        </p:nvPicPr>
+        <p:blipFill>
+          <a:blip r:embed="rId26">
+            <a:extLst>
+              <a:ext uri="{28A0092B-C50C-407E-A947-70E740481C1C}">
+                <a14:useLocalDpi xmlns:a14="http://schemas.microsoft.com/office/drawing/2010/main" val="0"/>
+              </a:ext>
+            </a:extLst>
+          </a:blip>
+          <a:stretch>
+            <a:fillRect/>
+          </a:stretch>
+        </p:blipFill>
+        <p:spPr>
+          <a:xfrm>
+            <a:off x="849608" y="2572228"/>
+            <a:ext cx="1400784" cy="988789"/>
+          </a:xfrm>
+          <a:prstGeom prst="rect">
+            <a:avLst/>
+          </a:prstGeom>
+        </p:spPr>
+      </p:pic>
     </p:spTree>
     <p:extLst>
       <p:ext uri="{BB962C8B-B14F-4D97-AF65-F5344CB8AC3E}">

</xml_diff>